<commit_message>
Added AO, particle effects, and better grid geometry
</commit_message>
<xml_diff>
--- a/Process/TicTacToe_Process.pptx
+++ b/Process/TicTacToe_Process.pptx
@@ -7,6 +7,7 @@
   <p:sldIdLst>
     <p:sldId id="256" r:id="rId2"/>
     <p:sldId id="257" r:id="rId3"/>
+    <p:sldId id="258" r:id="rId4"/>
   </p:sldIdLst>
   <p:sldSz cx="12192000" cy="6858000"/>
   <p:notesSz cx="6858000" cy="9144000"/>
@@ -105,6 +106,11 @@
       </a:defRPr>
     </a:lvl9pPr>
   </p:defaultTextStyle>
+  <p:extLst>
+    <p:ext uri="{EFAFB233-063F-42B5-8137-9DF3F51BA10A}">
+      <p15:sldGuideLst xmlns:p15="http://schemas.microsoft.com/office/powerpoint/2012/main"/>
+    </p:ext>
+  </p:extLst>
 </p:presentation>
 </file>
 
@@ -3448,8 +3454,8 @@
         </p:nvSpPr>
         <p:spPr>
           <a:xfrm>
-            <a:off x="838200" y="1844675"/>
-            <a:ext cx="4076700" cy="4319856"/>
+            <a:off x="504914" y="1844675"/>
+            <a:ext cx="3673623" cy="4319856"/>
           </a:xfrm>
         </p:spPr>
         <p:txBody>
@@ -3477,7 +3483,13 @@
               </a:lnSpc>
             </a:pPr>
             <a:r>
-              <a:rPr lang="en-US" sz="1200" dirty="0"/>
+              <a:rPr lang="en-US" sz="1200" dirty="0">
+                <a:solidFill>
+                  <a:schemeClr val="bg1">
+                    <a:lumMod val="85000"/>
+                  </a:schemeClr>
+                </a:solidFill>
+              </a:rPr>
               <a:t>Table initially too high</a:t>
             </a:r>
           </a:p>
@@ -3511,7 +3523,13 @@
               </a:lnSpc>
             </a:pPr>
             <a:r>
-              <a:rPr lang="en-US" sz="1200" dirty="0"/>
+              <a:rPr lang="en-US" sz="1200" dirty="0">
+                <a:solidFill>
+                  <a:schemeClr val="bg1">
+                    <a:lumMod val="85000"/>
+                  </a:schemeClr>
+                </a:solidFill>
+              </a:rPr>
               <a:t>Get rid of glowing orb below legs</a:t>
             </a:r>
           </a:p>
@@ -3522,7 +3540,13 @@
               </a:lnSpc>
             </a:pPr>
             <a:r>
-              <a:rPr lang="en-US" sz="1200" dirty="0"/>
+              <a:rPr lang="en-US" sz="1200" dirty="0">
+                <a:solidFill>
+                  <a:schemeClr val="bg1">
+                    <a:lumMod val="85000"/>
+                  </a:schemeClr>
+                </a:solidFill>
+              </a:rPr>
               <a:t>Hard to read the score (rotate towards head)</a:t>
             </a:r>
           </a:p>
@@ -3533,7 +3557,13 @@
               </a:lnSpc>
             </a:pPr>
             <a:r>
-              <a:rPr lang="en-US" sz="1200" dirty="0"/>
+              <a:rPr lang="en-US" sz="1200" dirty="0">
+                <a:solidFill>
+                  <a:schemeClr val="bg1">
+                    <a:lumMod val="85000"/>
+                  </a:schemeClr>
+                </a:solidFill>
+              </a:rPr>
               <a:t>Move containers even with table</a:t>
             </a:r>
           </a:p>
@@ -3544,7 +3574,13 @@
               </a:lnSpc>
             </a:pPr>
             <a:r>
-              <a:rPr lang="en-US" sz="1200" dirty="0"/>
+              <a:rPr lang="en-US" sz="1200" dirty="0">
+                <a:solidFill>
+                  <a:schemeClr val="bg1">
+                    <a:lumMod val="85000"/>
+                  </a:schemeClr>
+                </a:solidFill>
+              </a:rPr>
               <a:t>Cubes disappear too slowly when dropped</a:t>
             </a:r>
           </a:p>
@@ -3555,7 +3591,13 @@
               </a:lnSpc>
             </a:pPr>
             <a:r>
-              <a:rPr lang="en-US" sz="1200" dirty="0"/>
+              <a:rPr lang="en-US" sz="1200" dirty="0">
+                <a:solidFill>
+                  <a:schemeClr val="bg1">
+                    <a:lumMod val="85000"/>
+                  </a:schemeClr>
+                </a:solidFill>
+              </a:rPr>
               <a:t>Add Ambient Occlusion.</a:t>
             </a:r>
           </a:p>
@@ -3566,7 +3608,13 @@
               </a:lnSpc>
             </a:pPr>
             <a:r>
-              <a:rPr lang="en-US" sz="1200" dirty="0"/>
+              <a:rPr lang="en-US" sz="1200" dirty="0">
+                <a:solidFill>
+                  <a:schemeClr val="bg1">
+                    <a:lumMod val="85000"/>
+                  </a:schemeClr>
+                </a:solidFill>
+              </a:rPr>
               <a:t>Confusing that the reset button resets the score. Put the button under the score indicator</a:t>
             </a:r>
           </a:p>
@@ -3582,37 +3630,20 @@
             </a:r>
           </a:p>
           <a:p>
-            <a:pPr marL="0" indent="0">
-              <a:lnSpc>
-                <a:spcPct val="100000"/>
-              </a:lnSpc>
-              <a:buNone/>
-            </a:pPr>
-            <a:r>
-              <a:rPr lang="en-US" sz="1600" b="1" dirty="0"/>
-              <a:t>Particles</a:t>
-            </a:r>
-          </a:p>
-          <a:p>
             <a:pPr>
               <a:lnSpc>
                 <a:spcPct val="100000"/>
               </a:lnSpc>
             </a:pPr>
             <a:r>
-              <a:rPr lang="en-US" sz="1200" dirty="0"/>
-              <a:t>Poof particle when object drops on the ground</a:t>
-            </a:r>
-          </a:p>
-          <a:p>
-            <a:pPr>
-              <a:lnSpc>
-                <a:spcPct val="100000"/>
-              </a:lnSpc>
-            </a:pPr>
-            <a:r>
-              <a:rPr lang="en-US" sz="1200" dirty="0"/>
-              <a:t>Hovering game-piece on board</a:t>
+              <a:rPr lang="en-US" sz="1200" dirty="0">
+                <a:solidFill>
+                  <a:schemeClr val="bg1">
+                    <a:lumMod val="85000"/>
+                  </a:schemeClr>
+                </a:solidFill>
+              </a:rPr>
+              <a:t>Z-fighting issue on board geometry</a:t>
             </a:r>
           </a:p>
           <a:p>
@@ -3642,8 +3673,8 @@
         </p:nvSpPr>
         <p:spPr>
           <a:xfrm>
-            <a:off x="5861050" y="1844675"/>
-            <a:ext cx="4508500" cy="4319856"/>
+            <a:off x="4581614" y="1844675"/>
+            <a:ext cx="3673623" cy="4319856"/>
           </a:xfrm>
           <a:prstGeom prst="rect">
             <a:avLst/>
@@ -3934,6 +3965,199 @@
               <a:t>Block placing pieces while its not your turn (make shapes turn transparent when near the board)</a:t>
             </a:r>
           </a:p>
+        </p:txBody>
+      </p:sp>
+      <p:sp>
+        <p:nvSpPr>
+          <p:cNvPr id="5" name="Content Placeholder 2">
+            <a:extLst>
+              <a:ext uri="{FF2B5EF4-FFF2-40B4-BE49-F238E27FC236}">
+                <a16:creationId xmlns:a16="http://schemas.microsoft.com/office/drawing/2014/main" id="{A734DB35-157A-49F6-A2B7-DA1F6F3DB8FC}"/>
+              </a:ext>
+            </a:extLst>
+          </p:cNvPr>
+          <p:cNvSpPr txBox="1">
+            <a:spLocks/>
+          </p:cNvSpPr>
+          <p:nvPr/>
+        </p:nvSpPr>
+        <p:spPr>
+          <a:xfrm>
+            <a:off x="8236603" y="1844675"/>
+            <a:ext cx="3522410" cy="4319856"/>
+          </a:xfrm>
+          <a:prstGeom prst="rect">
+            <a:avLst/>
+          </a:prstGeom>
+        </p:spPr>
+        <p:txBody>
+          <a:bodyPr vert="horz" lIns="91440" tIns="45720" rIns="91440" bIns="45720" rtlCol="0">
+            <a:noAutofit/>
+          </a:bodyPr>
+          <a:lstStyle>
+            <a:lvl1pPr marL="228600" indent="-228600" algn="l" defTabSz="914400" rtl="0" eaLnBrk="1" latinLnBrk="0" hangingPunct="1">
+              <a:lnSpc>
+                <a:spcPct val="90000"/>
+              </a:lnSpc>
+              <a:spcBef>
+                <a:spcPts val="1000"/>
+              </a:spcBef>
+              <a:buFont typeface="Arial" panose="020B0604020202020204" pitchFamily="34" charset="0"/>
+              <a:buChar char="•"/>
+              <a:defRPr sz="2800" kern="1200">
+                <a:solidFill>
+                  <a:schemeClr val="tx1"/>
+                </a:solidFill>
+                <a:latin typeface="+mn-lt"/>
+                <a:ea typeface="+mn-ea"/>
+                <a:cs typeface="+mn-cs"/>
+              </a:defRPr>
+            </a:lvl1pPr>
+            <a:lvl2pPr marL="685800" indent="-228600" algn="l" defTabSz="914400" rtl="0" eaLnBrk="1" latinLnBrk="0" hangingPunct="1">
+              <a:lnSpc>
+                <a:spcPct val="90000"/>
+              </a:lnSpc>
+              <a:spcBef>
+                <a:spcPts val="500"/>
+              </a:spcBef>
+              <a:buFont typeface="Arial" panose="020B0604020202020204" pitchFamily="34" charset="0"/>
+              <a:buChar char="•"/>
+              <a:defRPr sz="2400" kern="1200">
+                <a:solidFill>
+                  <a:schemeClr val="tx1"/>
+                </a:solidFill>
+                <a:latin typeface="+mn-lt"/>
+                <a:ea typeface="+mn-ea"/>
+                <a:cs typeface="+mn-cs"/>
+              </a:defRPr>
+            </a:lvl2pPr>
+            <a:lvl3pPr marL="1143000" indent="-228600" algn="l" defTabSz="914400" rtl="0" eaLnBrk="1" latinLnBrk="0" hangingPunct="1">
+              <a:lnSpc>
+                <a:spcPct val="90000"/>
+              </a:lnSpc>
+              <a:spcBef>
+                <a:spcPts val="500"/>
+              </a:spcBef>
+              <a:buFont typeface="Arial" panose="020B0604020202020204" pitchFamily="34" charset="0"/>
+              <a:buChar char="•"/>
+              <a:defRPr sz="2000" kern="1200">
+                <a:solidFill>
+                  <a:schemeClr val="tx1"/>
+                </a:solidFill>
+                <a:latin typeface="+mn-lt"/>
+                <a:ea typeface="+mn-ea"/>
+                <a:cs typeface="+mn-cs"/>
+              </a:defRPr>
+            </a:lvl3pPr>
+            <a:lvl4pPr marL="1600200" indent="-228600" algn="l" defTabSz="914400" rtl="0" eaLnBrk="1" latinLnBrk="0" hangingPunct="1">
+              <a:lnSpc>
+                <a:spcPct val="90000"/>
+              </a:lnSpc>
+              <a:spcBef>
+                <a:spcPts val="500"/>
+              </a:spcBef>
+              <a:buFont typeface="Arial" panose="020B0604020202020204" pitchFamily="34" charset="0"/>
+              <a:buChar char="•"/>
+              <a:defRPr sz="1800" kern="1200">
+                <a:solidFill>
+                  <a:schemeClr val="tx1"/>
+                </a:solidFill>
+                <a:latin typeface="+mn-lt"/>
+                <a:ea typeface="+mn-ea"/>
+                <a:cs typeface="+mn-cs"/>
+              </a:defRPr>
+            </a:lvl4pPr>
+            <a:lvl5pPr marL="2057400" indent="-228600" algn="l" defTabSz="914400" rtl="0" eaLnBrk="1" latinLnBrk="0" hangingPunct="1">
+              <a:lnSpc>
+                <a:spcPct val="90000"/>
+              </a:lnSpc>
+              <a:spcBef>
+                <a:spcPts val="500"/>
+              </a:spcBef>
+              <a:buFont typeface="Arial" panose="020B0604020202020204" pitchFamily="34" charset="0"/>
+              <a:buChar char="•"/>
+              <a:defRPr sz="1800" kern="1200">
+                <a:solidFill>
+                  <a:schemeClr val="tx1"/>
+                </a:solidFill>
+                <a:latin typeface="+mn-lt"/>
+                <a:ea typeface="+mn-ea"/>
+                <a:cs typeface="+mn-cs"/>
+              </a:defRPr>
+            </a:lvl5pPr>
+            <a:lvl6pPr marL="2514600" indent="-228600" algn="l" defTabSz="914400" rtl="0" eaLnBrk="1" latinLnBrk="0" hangingPunct="1">
+              <a:lnSpc>
+                <a:spcPct val="90000"/>
+              </a:lnSpc>
+              <a:spcBef>
+                <a:spcPts val="500"/>
+              </a:spcBef>
+              <a:buFont typeface="Arial" panose="020B0604020202020204" pitchFamily="34" charset="0"/>
+              <a:buChar char="•"/>
+              <a:defRPr sz="1800" kern="1200">
+                <a:solidFill>
+                  <a:schemeClr val="tx1"/>
+                </a:solidFill>
+                <a:latin typeface="+mn-lt"/>
+                <a:ea typeface="+mn-ea"/>
+                <a:cs typeface="+mn-cs"/>
+              </a:defRPr>
+            </a:lvl6pPr>
+            <a:lvl7pPr marL="2971800" indent="-228600" algn="l" defTabSz="914400" rtl="0" eaLnBrk="1" latinLnBrk="0" hangingPunct="1">
+              <a:lnSpc>
+                <a:spcPct val="90000"/>
+              </a:lnSpc>
+              <a:spcBef>
+                <a:spcPts val="500"/>
+              </a:spcBef>
+              <a:buFont typeface="Arial" panose="020B0604020202020204" pitchFamily="34" charset="0"/>
+              <a:buChar char="•"/>
+              <a:defRPr sz="1800" kern="1200">
+                <a:solidFill>
+                  <a:schemeClr val="tx1"/>
+                </a:solidFill>
+                <a:latin typeface="+mn-lt"/>
+                <a:ea typeface="+mn-ea"/>
+                <a:cs typeface="+mn-cs"/>
+              </a:defRPr>
+            </a:lvl7pPr>
+            <a:lvl8pPr marL="3429000" indent="-228600" algn="l" defTabSz="914400" rtl="0" eaLnBrk="1" latinLnBrk="0" hangingPunct="1">
+              <a:lnSpc>
+                <a:spcPct val="90000"/>
+              </a:lnSpc>
+              <a:spcBef>
+                <a:spcPts val="500"/>
+              </a:spcBef>
+              <a:buFont typeface="Arial" panose="020B0604020202020204" pitchFamily="34" charset="0"/>
+              <a:buChar char="•"/>
+              <a:defRPr sz="1800" kern="1200">
+                <a:solidFill>
+                  <a:schemeClr val="tx1"/>
+                </a:solidFill>
+                <a:latin typeface="+mn-lt"/>
+                <a:ea typeface="+mn-ea"/>
+                <a:cs typeface="+mn-cs"/>
+              </a:defRPr>
+            </a:lvl8pPr>
+            <a:lvl9pPr marL="3886200" indent="-228600" algn="l" defTabSz="914400" rtl="0" eaLnBrk="1" latinLnBrk="0" hangingPunct="1">
+              <a:lnSpc>
+                <a:spcPct val="90000"/>
+              </a:lnSpc>
+              <a:spcBef>
+                <a:spcPts val="500"/>
+              </a:spcBef>
+              <a:buFont typeface="Arial" panose="020B0604020202020204" pitchFamily="34" charset="0"/>
+              <a:buChar char="•"/>
+              <a:defRPr sz="1800" kern="1200">
+                <a:solidFill>
+                  <a:schemeClr val="tx1"/>
+                </a:solidFill>
+                <a:latin typeface="+mn-lt"/>
+                <a:ea typeface="+mn-ea"/>
+                <a:cs typeface="+mn-cs"/>
+              </a:defRPr>
+            </a:lvl9pPr>
+          </a:lstStyle>
           <a:p>
             <a:pPr marL="0" indent="0">
               <a:lnSpc>
@@ -3943,7 +4167,53 @@
             </a:pPr>
             <a:r>
               <a:rPr lang="en-US" sz="1600" b="1" dirty="0"/>
-              <a:t>Immersion</a:t>
+              <a:t>Particles</a:t>
+            </a:r>
+          </a:p>
+          <a:p>
+            <a:pPr>
+              <a:lnSpc>
+                <a:spcPct val="100000"/>
+              </a:lnSpc>
+            </a:pPr>
+            <a:r>
+              <a:rPr lang="en-US" sz="1200" dirty="0">
+                <a:solidFill>
+                  <a:schemeClr val="bg1">
+                    <a:lumMod val="85000"/>
+                  </a:schemeClr>
+                </a:solidFill>
+              </a:rPr>
+              <a:t>Poof particle when object drops on the ground</a:t>
+            </a:r>
+          </a:p>
+          <a:p>
+            <a:pPr>
+              <a:lnSpc>
+                <a:spcPct val="100000"/>
+              </a:lnSpc>
+            </a:pPr>
+            <a:r>
+              <a:rPr lang="en-US" sz="1200" dirty="0">
+                <a:solidFill>
+                  <a:schemeClr val="bg1">
+                    <a:lumMod val="85000"/>
+                  </a:schemeClr>
+                </a:solidFill>
+              </a:rPr>
+              <a:t>Sparkles when hover game-piece over board</a:t>
+            </a:r>
+          </a:p>
+          <a:p>
+            <a:pPr marL="0" indent="0">
+              <a:lnSpc>
+                <a:spcPct val="100000"/>
+              </a:lnSpc>
+              <a:buNone/>
+            </a:pPr>
+            <a:r>
+              <a:rPr lang="en-US" sz="1600" b="1" dirty="0"/>
+              <a:t>UX</a:t>
             </a:r>
           </a:p>
           <a:p>
@@ -3957,12 +4227,1029 @@
               <a:t>Hands should push pieces around in container</a:t>
             </a:r>
           </a:p>
-        </p:txBody>
-      </p:sp>
+          <a:p>
+            <a:pPr>
+              <a:lnSpc>
+                <a:spcPct val="100000"/>
+              </a:lnSpc>
+            </a:pPr>
+            <a:r>
+              <a:rPr lang="en-US" sz="1200" dirty="0"/>
+              <a:t>Handle should move to hand when changing table height</a:t>
+            </a:r>
+          </a:p>
+          <a:p>
+            <a:pPr>
+              <a:lnSpc>
+                <a:spcPct val="100000"/>
+              </a:lnSpc>
+            </a:pPr>
+            <a:r>
+              <a:rPr lang="en-US" sz="1200" dirty="0"/>
+              <a:t>Let the player throw objects at the AI</a:t>
+            </a:r>
+          </a:p>
+          <a:p>
+            <a:pPr>
+              <a:lnSpc>
+                <a:spcPct val="100000"/>
+              </a:lnSpc>
+            </a:pPr>
+            <a:endParaRPr lang="en-US" sz="1600" dirty="0"/>
+          </a:p>
+          <a:p>
+            <a:pPr>
+              <a:lnSpc>
+                <a:spcPct val="100000"/>
+              </a:lnSpc>
+            </a:pPr>
+            <a:endParaRPr lang="en-US" sz="1200" dirty="0"/>
+          </a:p>
+        </p:txBody>
+      </p:sp>
+      <p:pic>
+        <p:nvPicPr>
+          <p:cNvPr id="7" name="Picture 6">
+            <a:extLst>
+              <a:ext uri="{FF2B5EF4-FFF2-40B4-BE49-F238E27FC236}">
+                <a16:creationId xmlns:a16="http://schemas.microsoft.com/office/drawing/2014/main" id="{CB748372-647B-4E45-B3D3-596298201565}"/>
+              </a:ext>
+            </a:extLst>
+          </p:cNvPr>
+          <p:cNvPicPr>
+            <a:picLocks noChangeAspect="1"/>
+          </p:cNvPicPr>
+          <p:nvPr/>
+        </p:nvPicPr>
+        <p:blipFill rotWithShape="1">
+          <a:blip r:embed="rId2">
+            <a:extLst>
+              <a:ext uri="{28A0092B-C50C-407E-A947-70E740481C1C}">
+                <a14:useLocalDpi xmlns:a14="http://schemas.microsoft.com/office/drawing/2010/main" val="0"/>
+              </a:ext>
+            </a:extLst>
+          </a:blip>
+          <a:srcRect t="16875" b="8125"/>
+          <a:stretch/>
+        </p:blipFill>
+        <p:spPr>
+          <a:xfrm>
+            <a:off x="0" y="0"/>
+            <a:ext cx="12192000" cy="6858000"/>
+          </a:xfrm>
+          <a:prstGeom prst="rect">
+            <a:avLst/>
+          </a:prstGeom>
+        </p:spPr>
+      </p:pic>
     </p:spTree>
     <p:extLst>
       <p:ext uri="{BB962C8B-B14F-4D97-AF65-F5344CB8AC3E}">
         <p14:creationId xmlns:p14="http://schemas.microsoft.com/office/powerpoint/2010/main" val="13577301"/>
+      </p:ext>
+    </p:extLst>
+  </p:cSld>
+  <p:clrMapOvr>
+    <a:masterClrMapping/>
+  </p:clrMapOvr>
+</p:sld>
+</file>
+
+<file path=ppt/slides/slide3.xml><?xml version="1.0" encoding="utf-8"?>
+<p:sld xmlns:a="http://schemas.openxmlformats.org/drawingml/2006/main" xmlns:r="http://schemas.openxmlformats.org/officeDocument/2006/relationships" xmlns:p="http://schemas.openxmlformats.org/presentationml/2006/main">
+  <p:cSld>
+    <p:spTree>
+      <p:nvGrpSpPr>
+        <p:cNvPr id="1" name=""/>
+        <p:cNvGrpSpPr/>
+        <p:nvPr/>
+      </p:nvGrpSpPr>
+      <p:grpSpPr>
+        <a:xfrm>
+          <a:off x="0" y="0"/>
+          <a:ext cx="0" cy="0"/>
+          <a:chOff x="0" y="0"/>
+          <a:chExt cx="0" cy="0"/>
+        </a:xfrm>
+      </p:grpSpPr>
+      <p:sp>
+        <p:nvSpPr>
+          <p:cNvPr id="6" name="Rectangle 5">
+            <a:extLst>
+              <a:ext uri="{FF2B5EF4-FFF2-40B4-BE49-F238E27FC236}">
+                <a16:creationId xmlns:a16="http://schemas.microsoft.com/office/drawing/2014/main" id="{5B7A795D-069F-4F6A-95C9-93ED429EB112}"/>
+              </a:ext>
+            </a:extLst>
+          </p:cNvPr>
+          <p:cNvSpPr/>
+          <p:nvPr/>
+        </p:nvSpPr>
+        <p:spPr>
+          <a:xfrm>
+            <a:off x="8530198" y="4517439"/>
+            <a:ext cx="3251675" cy="1975436"/>
+          </a:xfrm>
+          <a:prstGeom prst="rect">
+            <a:avLst/>
+          </a:prstGeom>
+          <a:solidFill>
+            <a:schemeClr val="bg1">
+              <a:lumMod val="65000"/>
+              <a:alpha val="58824"/>
+            </a:schemeClr>
+          </a:solidFill>
+          <a:ln>
+            <a:noFill/>
+          </a:ln>
+        </p:spPr>
+        <p:style>
+          <a:lnRef idx="2">
+            <a:schemeClr val="accent1">
+              <a:shade val="50000"/>
+            </a:schemeClr>
+          </a:lnRef>
+          <a:fillRef idx="1">
+            <a:schemeClr val="accent1"/>
+          </a:fillRef>
+          <a:effectRef idx="0">
+            <a:schemeClr val="accent1"/>
+          </a:effectRef>
+          <a:fontRef idx="minor">
+            <a:schemeClr val="lt1"/>
+          </a:fontRef>
+        </p:style>
+        <p:txBody>
+          <a:bodyPr rtlCol="0" anchor="ctr"/>
+          <a:lstStyle/>
+          <a:p>
+            <a:pPr algn="ctr"/>
+            <a:endParaRPr lang="en-US"/>
+          </a:p>
+        </p:txBody>
+      </p:sp>
+      <p:sp>
+        <p:nvSpPr>
+          <p:cNvPr id="2" name="Title 1">
+            <a:extLst>
+              <a:ext uri="{FF2B5EF4-FFF2-40B4-BE49-F238E27FC236}">
+                <a16:creationId xmlns:a16="http://schemas.microsoft.com/office/drawing/2014/main" id="{C44A43E7-70B6-4CAA-B7F5-17823D6E5390}"/>
+              </a:ext>
+            </a:extLst>
+          </p:cNvPr>
+          <p:cNvSpPr>
+            <a:spLocks noGrp="1"/>
+          </p:cNvSpPr>
+          <p:nvPr>
+            <p:ph type="title"/>
+          </p:nvPr>
+        </p:nvSpPr>
+        <p:spPr/>
+        <p:txBody>
+          <a:bodyPr/>
+          <a:lstStyle/>
+          <a:p>
+            <a:r>
+              <a:rPr lang="en-US" dirty="0"/>
+              <a:t>User Feedback Session #1</a:t>
+            </a:r>
+          </a:p>
+        </p:txBody>
+      </p:sp>
+      <p:sp>
+        <p:nvSpPr>
+          <p:cNvPr id="3" name="Content Placeholder 2">
+            <a:extLst>
+              <a:ext uri="{FF2B5EF4-FFF2-40B4-BE49-F238E27FC236}">
+                <a16:creationId xmlns:a16="http://schemas.microsoft.com/office/drawing/2014/main" id="{0830CFCE-97AA-4906-8C58-0313532BEBAE}"/>
+              </a:ext>
+            </a:extLst>
+          </p:cNvPr>
+          <p:cNvSpPr>
+            <a:spLocks noGrp="1"/>
+          </p:cNvSpPr>
+          <p:nvPr>
+            <p:ph idx="1"/>
+          </p:nvPr>
+        </p:nvSpPr>
+        <p:spPr>
+          <a:xfrm>
+            <a:off x="504914" y="1844675"/>
+            <a:ext cx="3673623" cy="4319856"/>
+          </a:xfrm>
+        </p:spPr>
+        <p:txBody>
+          <a:bodyPr>
+            <a:noAutofit/>
+          </a:bodyPr>
+          <a:lstStyle/>
+          <a:p>
+            <a:pPr marL="0" indent="0">
+              <a:lnSpc>
+                <a:spcPct val="100000"/>
+              </a:lnSpc>
+              <a:buNone/>
+            </a:pPr>
+            <a:r>
+              <a:rPr lang="en-US" sz="1600" b="1" dirty="0"/>
+              <a:t>Comfort</a:t>
+            </a:r>
+            <a:endParaRPr lang="en-US" sz="1200" b="1" dirty="0"/>
+          </a:p>
+          <a:p>
+            <a:pPr>
+              <a:lnSpc>
+                <a:spcPct val="100000"/>
+              </a:lnSpc>
+            </a:pPr>
+            <a:r>
+              <a:rPr lang="en-US" sz="1200" dirty="0">
+                <a:solidFill>
+                  <a:schemeClr val="bg1">
+                    <a:lumMod val="85000"/>
+                  </a:schemeClr>
+                </a:solidFill>
+              </a:rPr>
+              <a:t>Table initially too high</a:t>
+            </a:r>
+          </a:p>
+          <a:p>
+            <a:pPr>
+              <a:lnSpc>
+                <a:spcPct val="100000"/>
+              </a:lnSpc>
+            </a:pPr>
+            <a:r>
+              <a:rPr lang="en-US" sz="1200" dirty="0"/>
+              <a:t>All table motion in all directions, not just up/down</a:t>
+            </a:r>
+          </a:p>
+          <a:p>
+            <a:pPr marL="0" indent="0">
+              <a:lnSpc>
+                <a:spcPct val="100000"/>
+              </a:lnSpc>
+              <a:buNone/>
+            </a:pPr>
+            <a:r>
+              <a:rPr lang="en-US" sz="1600" b="1" dirty="0"/>
+              <a:t>Visual Design</a:t>
+            </a:r>
+          </a:p>
+          <a:p>
+            <a:pPr>
+              <a:lnSpc>
+                <a:spcPct val="100000"/>
+              </a:lnSpc>
+            </a:pPr>
+            <a:r>
+              <a:rPr lang="en-US" sz="1200" dirty="0">
+                <a:solidFill>
+                  <a:schemeClr val="bg1">
+                    <a:lumMod val="85000"/>
+                  </a:schemeClr>
+                </a:solidFill>
+              </a:rPr>
+              <a:t>Get rid of glowing orb below legs</a:t>
+            </a:r>
+          </a:p>
+          <a:p>
+            <a:pPr>
+              <a:lnSpc>
+                <a:spcPct val="100000"/>
+              </a:lnSpc>
+            </a:pPr>
+            <a:r>
+              <a:rPr lang="en-US" sz="1200" dirty="0">
+                <a:solidFill>
+                  <a:schemeClr val="bg1">
+                    <a:lumMod val="85000"/>
+                  </a:schemeClr>
+                </a:solidFill>
+              </a:rPr>
+              <a:t>Hard to read the score (rotate towards head)</a:t>
+            </a:r>
+          </a:p>
+          <a:p>
+            <a:pPr>
+              <a:lnSpc>
+                <a:spcPct val="100000"/>
+              </a:lnSpc>
+            </a:pPr>
+            <a:r>
+              <a:rPr lang="en-US" sz="1200" dirty="0">
+                <a:solidFill>
+                  <a:schemeClr val="bg1">
+                    <a:lumMod val="85000"/>
+                  </a:schemeClr>
+                </a:solidFill>
+              </a:rPr>
+              <a:t>Move containers even with table</a:t>
+            </a:r>
+          </a:p>
+          <a:p>
+            <a:pPr>
+              <a:lnSpc>
+                <a:spcPct val="100000"/>
+              </a:lnSpc>
+            </a:pPr>
+            <a:r>
+              <a:rPr lang="en-US" sz="1200" dirty="0">
+                <a:solidFill>
+                  <a:schemeClr val="bg1">
+                    <a:lumMod val="85000"/>
+                  </a:schemeClr>
+                </a:solidFill>
+              </a:rPr>
+              <a:t>Cubes disappear too slowly when dropped</a:t>
+            </a:r>
+          </a:p>
+          <a:p>
+            <a:pPr>
+              <a:lnSpc>
+                <a:spcPct val="100000"/>
+              </a:lnSpc>
+            </a:pPr>
+            <a:r>
+              <a:rPr lang="en-US" sz="1200" dirty="0">
+                <a:solidFill>
+                  <a:schemeClr val="bg1">
+                    <a:lumMod val="85000"/>
+                  </a:schemeClr>
+                </a:solidFill>
+              </a:rPr>
+              <a:t>Add Ambient Occlusion.</a:t>
+            </a:r>
+          </a:p>
+          <a:p>
+            <a:pPr>
+              <a:lnSpc>
+                <a:spcPct val="100000"/>
+              </a:lnSpc>
+            </a:pPr>
+            <a:r>
+              <a:rPr lang="en-US" sz="1200" dirty="0">
+                <a:solidFill>
+                  <a:schemeClr val="bg1">
+                    <a:lumMod val="85000"/>
+                  </a:schemeClr>
+                </a:solidFill>
+              </a:rPr>
+              <a:t>Confusing that the reset button resets the score. Put the button under the score indicator</a:t>
+            </a:r>
+          </a:p>
+          <a:p>
+            <a:pPr>
+              <a:lnSpc>
+                <a:spcPct val="100000"/>
+              </a:lnSpc>
+            </a:pPr>
+            <a:r>
+              <a:rPr lang="en-US" sz="1200" dirty="0"/>
+              <a:t>Add initial “Pick me up” Text near your container at the start of the game.</a:t>
+            </a:r>
+          </a:p>
+          <a:p>
+            <a:pPr>
+              <a:lnSpc>
+                <a:spcPct val="100000"/>
+              </a:lnSpc>
+            </a:pPr>
+            <a:r>
+              <a:rPr lang="en-US" sz="1200" dirty="0">
+                <a:solidFill>
+                  <a:schemeClr val="bg1">
+                    <a:lumMod val="85000"/>
+                  </a:schemeClr>
+                </a:solidFill>
+              </a:rPr>
+              <a:t>Z-fighting issue on board geometry</a:t>
+            </a:r>
+          </a:p>
+          <a:p>
+            <a:pPr marL="0" indent="0">
+              <a:lnSpc>
+                <a:spcPct val="100000"/>
+              </a:lnSpc>
+              <a:buNone/>
+            </a:pPr>
+            <a:endParaRPr lang="en-US" sz="1200" dirty="0"/>
+          </a:p>
+        </p:txBody>
+      </p:sp>
+      <p:sp>
+        <p:nvSpPr>
+          <p:cNvPr id="4" name="Content Placeholder 2">
+            <a:extLst>
+              <a:ext uri="{FF2B5EF4-FFF2-40B4-BE49-F238E27FC236}">
+                <a16:creationId xmlns:a16="http://schemas.microsoft.com/office/drawing/2014/main" id="{70469043-E0B9-4A4B-A270-684AF7F8BD4F}"/>
+              </a:ext>
+            </a:extLst>
+          </p:cNvPr>
+          <p:cNvSpPr txBox="1">
+            <a:spLocks/>
+          </p:cNvSpPr>
+          <p:nvPr/>
+        </p:nvSpPr>
+        <p:spPr>
+          <a:xfrm>
+            <a:off x="4581614" y="1844675"/>
+            <a:ext cx="3673623" cy="4319856"/>
+          </a:xfrm>
+          <a:prstGeom prst="rect">
+            <a:avLst/>
+          </a:prstGeom>
+        </p:spPr>
+        <p:txBody>
+          <a:bodyPr vert="horz" lIns="91440" tIns="45720" rIns="91440" bIns="45720" rtlCol="0">
+            <a:noAutofit/>
+          </a:bodyPr>
+          <a:lstStyle>
+            <a:lvl1pPr marL="228600" indent="-228600" algn="l" defTabSz="914400" rtl="0" eaLnBrk="1" latinLnBrk="0" hangingPunct="1">
+              <a:lnSpc>
+                <a:spcPct val="90000"/>
+              </a:lnSpc>
+              <a:spcBef>
+                <a:spcPts val="1000"/>
+              </a:spcBef>
+              <a:buFont typeface="Arial" panose="020B0604020202020204" pitchFamily="34" charset="0"/>
+              <a:buChar char="•"/>
+              <a:defRPr sz="2800" kern="1200">
+                <a:solidFill>
+                  <a:schemeClr val="tx1"/>
+                </a:solidFill>
+                <a:latin typeface="+mn-lt"/>
+                <a:ea typeface="+mn-ea"/>
+                <a:cs typeface="+mn-cs"/>
+              </a:defRPr>
+            </a:lvl1pPr>
+            <a:lvl2pPr marL="685800" indent="-228600" algn="l" defTabSz="914400" rtl="0" eaLnBrk="1" latinLnBrk="0" hangingPunct="1">
+              <a:lnSpc>
+                <a:spcPct val="90000"/>
+              </a:lnSpc>
+              <a:spcBef>
+                <a:spcPts val="500"/>
+              </a:spcBef>
+              <a:buFont typeface="Arial" panose="020B0604020202020204" pitchFamily="34" charset="0"/>
+              <a:buChar char="•"/>
+              <a:defRPr sz="2400" kern="1200">
+                <a:solidFill>
+                  <a:schemeClr val="tx1"/>
+                </a:solidFill>
+                <a:latin typeface="+mn-lt"/>
+                <a:ea typeface="+mn-ea"/>
+                <a:cs typeface="+mn-cs"/>
+              </a:defRPr>
+            </a:lvl2pPr>
+            <a:lvl3pPr marL="1143000" indent="-228600" algn="l" defTabSz="914400" rtl="0" eaLnBrk="1" latinLnBrk="0" hangingPunct="1">
+              <a:lnSpc>
+                <a:spcPct val="90000"/>
+              </a:lnSpc>
+              <a:spcBef>
+                <a:spcPts val="500"/>
+              </a:spcBef>
+              <a:buFont typeface="Arial" panose="020B0604020202020204" pitchFamily="34" charset="0"/>
+              <a:buChar char="•"/>
+              <a:defRPr sz="2000" kern="1200">
+                <a:solidFill>
+                  <a:schemeClr val="tx1"/>
+                </a:solidFill>
+                <a:latin typeface="+mn-lt"/>
+                <a:ea typeface="+mn-ea"/>
+                <a:cs typeface="+mn-cs"/>
+              </a:defRPr>
+            </a:lvl3pPr>
+            <a:lvl4pPr marL="1600200" indent="-228600" algn="l" defTabSz="914400" rtl="0" eaLnBrk="1" latinLnBrk="0" hangingPunct="1">
+              <a:lnSpc>
+                <a:spcPct val="90000"/>
+              </a:lnSpc>
+              <a:spcBef>
+                <a:spcPts val="500"/>
+              </a:spcBef>
+              <a:buFont typeface="Arial" panose="020B0604020202020204" pitchFamily="34" charset="0"/>
+              <a:buChar char="•"/>
+              <a:defRPr sz="1800" kern="1200">
+                <a:solidFill>
+                  <a:schemeClr val="tx1"/>
+                </a:solidFill>
+                <a:latin typeface="+mn-lt"/>
+                <a:ea typeface="+mn-ea"/>
+                <a:cs typeface="+mn-cs"/>
+              </a:defRPr>
+            </a:lvl4pPr>
+            <a:lvl5pPr marL="2057400" indent="-228600" algn="l" defTabSz="914400" rtl="0" eaLnBrk="1" latinLnBrk="0" hangingPunct="1">
+              <a:lnSpc>
+                <a:spcPct val="90000"/>
+              </a:lnSpc>
+              <a:spcBef>
+                <a:spcPts val="500"/>
+              </a:spcBef>
+              <a:buFont typeface="Arial" panose="020B0604020202020204" pitchFamily="34" charset="0"/>
+              <a:buChar char="•"/>
+              <a:defRPr sz="1800" kern="1200">
+                <a:solidFill>
+                  <a:schemeClr val="tx1"/>
+                </a:solidFill>
+                <a:latin typeface="+mn-lt"/>
+                <a:ea typeface="+mn-ea"/>
+                <a:cs typeface="+mn-cs"/>
+              </a:defRPr>
+            </a:lvl5pPr>
+            <a:lvl6pPr marL="2514600" indent="-228600" algn="l" defTabSz="914400" rtl="0" eaLnBrk="1" latinLnBrk="0" hangingPunct="1">
+              <a:lnSpc>
+                <a:spcPct val="90000"/>
+              </a:lnSpc>
+              <a:spcBef>
+                <a:spcPts val="500"/>
+              </a:spcBef>
+              <a:buFont typeface="Arial" panose="020B0604020202020204" pitchFamily="34" charset="0"/>
+              <a:buChar char="•"/>
+              <a:defRPr sz="1800" kern="1200">
+                <a:solidFill>
+                  <a:schemeClr val="tx1"/>
+                </a:solidFill>
+                <a:latin typeface="+mn-lt"/>
+                <a:ea typeface="+mn-ea"/>
+                <a:cs typeface="+mn-cs"/>
+              </a:defRPr>
+            </a:lvl6pPr>
+            <a:lvl7pPr marL="2971800" indent="-228600" algn="l" defTabSz="914400" rtl="0" eaLnBrk="1" latinLnBrk="0" hangingPunct="1">
+              <a:lnSpc>
+                <a:spcPct val="90000"/>
+              </a:lnSpc>
+              <a:spcBef>
+                <a:spcPts val="500"/>
+              </a:spcBef>
+              <a:buFont typeface="Arial" panose="020B0604020202020204" pitchFamily="34" charset="0"/>
+              <a:buChar char="•"/>
+              <a:defRPr sz="1800" kern="1200">
+                <a:solidFill>
+                  <a:schemeClr val="tx1"/>
+                </a:solidFill>
+                <a:latin typeface="+mn-lt"/>
+                <a:ea typeface="+mn-ea"/>
+                <a:cs typeface="+mn-cs"/>
+              </a:defRPr>
+            </a:lvl7pPr>
+            <a:lvl8pPr marL="3429000" indent="-228600" algn="l" defTabSz="914400" rtl="0" eaLnBrk="1" latinLnBrk="0" hangingPunct="1">
+              <a:lnSpc>
+                <a:spcPct val="90000"/>
+              </a:lnSpc>
+              <a:spcBef>
+                <a:spcPts val="500"/>
+              </a:spcBef>
+              <a:buFont typeface="Arial" panose="020B0604020202020204" pitchFamily="34" charset="0"/>
+              <a:buChar char="•"/>
+              <a:defRPr sz="1800" kern="1200">
+                <a:solidFill>
+                  <a:schemeClr val="tx1"/>
+                </a:solidFill>
+                <a:latin typeface="+mn-lt"/>
+                <a:ea typeface="+mn-ea"/>
+                <a:cs typeface="+mn-cs"/>
+              </a:defRPr>
+            </a:lvl8pPr>
+            <a:lvl9pPr marL="3886200" indent="-228600" algn="l" defTabSz="914400" rtl="0" eaLnBrk="1" latinLnBrk="0" hangingPunct="1">
+              <a:lnSpc>
+                <a:spcPct val="90000"/>
+              </a:lnSpc>
+              <a:spcBef>
+                <a:spcPts val="500"/>
+              </a:spcBef>
+              <a:buFont typeface="Arial" panose="020B0604020202020204" pitchFamily="34" charset="0"/>
+              <a:buChar char="•"/>
+              <a:defRPr sz="1800" kern="1200">
+                <a:solidFill>
+                  <a:schemeClr val="tx1"/>
+                </a:solidFill>
+                <a:latin typeface="+mn-lt"/>
+                <a:ea typeface="+mn-ea"/>
+                <a:cs typeface="+mn-cs"/>
+              </a:defRPr>
+            </a:lvl9pPr>
+          </a:lstStyle>
+          <a:p>
+            <a:pPr marL="0" indent="0">
+              <a:lnSpc>
+                <a:spcPct val="100000"/>
+              </a:lnSpc>
+              <a:buNone/>
+            </a:pPr>
+            <a:r>
+              <a:rPr lang="en-US" sz="1600" b="1" dirty="0"/>
+              <a:t>Avatar</a:t>
+            </a:r>
+            <a:endParaRPr lang="en-US" sz="1200" b="1" dirty="0"/>
+          </a:p>
+          <a:p>
+            <a:pPr>
+              <a:lnSpc>
+                <a:spcPct val="100000"/>
+              </a:lnSpc>
+            </a:pPr>
+            <a:r>
+              <a:rPr lang="en-US" sz="1200" dirty="0"/>
+              <a:t>Faces (at least blinking)</a:t>
+            </a:r>
+          </a:p>
+          <a:p>
+            <a:pPr>
+              <a:lnSpc>
+                <a:spcPct val="100000"/>
+              </a:lnSpc>
+            </a:pPr>
+            <a:r>
+              <a:rPr lang="en-US" sz="1200" dirty="0"/>
+              <a:t>More realistic motions / floating animation</a:t>
+            </a:r>
+          </a:p>
+          <a:p>
+            <a:pPr marL="0" indent="0">
+              <a:lnSpc>
+                <a:spcPct val="100000"/>
+              </a:lnSpc>
+              <a:buNone/>
+            </a:pPr>
+            <a:r>
+              <a:rPr lang="en-US" sz="1600" b="1" dirty="0"/>
+              <a:t>Haptics</a:t>
+            </a:r>
+            <a:endParaRPr lang="en-US" sz="1200" b="1" dirty="0"/>
+          </a:p>
+          <a:p>
+            <a:pPr>
+              <a:lnSpc>
+                <a:spcPct val="100000"/>
+              </a:lnSpc>
+            </a:pPr>
+            <a:r>
+              <a:rPr lang="en-US" sz="1200" dirty="0"/>
+              <a:t>When touching objects</a:t>
+            </a:r>
+            <a:endParaRPr lang="en-US" sz="1100" dirty="0"/>
+          </a:p>
+          <a:p>
+            <a:pPr marL="0" indent="0">
+              <a:lnSpc>
+                <a:spcPct val="100000"/>
+              </a:lnSpc>
+              <a:buNone/>
+            </a:pPr>
+            <a:r>
+              <a:rPr lang="en-US" sz="1600" b="1" dirty="0"/>
+              <a:t>Gameplay</a:t>
+            </a:r>
+            <a:endParaRPr lang="en-US" sz="1200" b="1" dirty="0"/>
+          </a:p>
+          <a:p>
+            <a:pPr>
+              <a:lnSpc>
+                <a:spcPct val="100000"/>
+              </a:lnSpc>
+            </a:pPr>
+            <a:r>
+              <a:rPr lang="en-US" sz="1200" dirty="0"/>
+              <a:t>Allow throwing shapes onto the table</a:t>
+            </a:r>
+          </a:p>
+          <a:p>
+            <a:pPr>
+              <a:lnSpc>
+                <a:spcPct val="100000"/>
+              </a:lnSpc>
+            </a:pPr>
+            <a:r>
+              <a:rPr lang="en-US" sz="1200" dirty="0"/>
+              <a:t>Communicate who’s turn it is</a:t>
+            </a:r>
+          </a:p>
+          <a:p>
+            <a:pPr>
+              <a:lnSpc>
+                <a:spcPct val="100000"/>
+              </a:lnSpc>
+            </a:pPr>
+            <a:r>
+              <a:rPr lang="en-US" sz="1200" dirty="0"/>
+              <a:t>Make it fun/sad when you lose. “Incredibly disappointing when I win that nothing happens”</a:t>
+            </a:r>
+          </a:p>
+          <a:p>
+            <a:pPr>
+              <a:lnSpc>
+                <a:spcPct val="100000"/>
+              </a:lnSpc>
+            </a:pPr>
+            <a:r>
+              <a:rPr lang="en-US" sz="1200" dirty="0"/>
+              <a:t>Block placing pieces while its not your turn (make shapes turn transparent when near the board)</a:t>
+            </a:r>
+          </a:p>
+        </p:txBody>
+      </p:sp>
+      <p:sp>
+        <p:nvSpPr>
+          <p:cNvPr id="5" name="Content Placeholder 2">
+            <a:extLst>
+              <a:ext uri="{FF2B5EF4-FFF2-40B4-BE49-F238E27FC236}">
+                <a16:creationId xmlns:a16="http://schemas.microsoft.com/office/drawing/2014/main" id="{A734DB35-157A-49F6-A2B7-DA1F6F3DB8FC}"/>
+              </a:ext>
+            </a:extLst>
+          </p:cNvPr>
+          <p:cNvSpPr txBox="1">
+            <a:spLocks/>
+          </p:cNvSpPr>
+          <p:nvPr/>
+        </p:nvSpPr>
+        <p:spPr>
+          <a:xfrm>
+            <a:off x="8236603" y="1844675"/>
+            <a:ext cx="3522410" cy="4319856"/>
+          </a:xfrm>
+          <a:prstGeom prst="rect">
+            <a:avLst/>
+          </a:prstGeom>
+        </p:spPr>
+        <p:txBody>
+          <a:bodyPr vert="horz" lIns="91440" tIns="45720" rIns="91440" bIns="45720" rtlCol="0">
+            <a:noAutofit/>
+          </a:bodyPr>
+          <a:lstStyle>
+            <a:lvl1pPr marL="228600" indent="-228600" algn="l" defTabSz="914400" rtl="0" eaLnBrk="1" latinLnBrk="0" hangingPunct="1">
+              <a:lnSpc>
+                <a:spcPct val="90000"/>
+              </a:lnSpc>
+              <a:spcBef>
+                <a:spcPts val="1000"/>
+              </a:spcBef>
+              <a:buFont typeface="Arial" panose="020B0604020202020204" pitchFamily="34" charset="0"/>
+              <a:buChar char="•"/>
+              <a:defRPr sz="2800" kern="1200">
+                <a:solidFill>
+                  <a:schemeClr val="tx1"/>
+                </a:solidFill>
+                <a:latin typeface="+mn-lt"/>
+                <a:ea typeface="+mn-ea"/>
+                <a:cs typeface="+mn-cs"/>
+              </a:defRPr>
+            </a:lvl1pPr>
+            <a:lvl2pPr marL="685800" indent="-228600" algn="l" defTabSz="914400" rtl="0" eaLnBrk="1" latinLnBrk="0" hangingPunct="1">
+              <a:lnSpc>
+                <a:spcPct val="90000"/>
+              </a:lnSpc>
+              <a:spcBef>
+                <a:spcPts val="500"/>
+              </a:spcBef>
+              <a:buFont typeface="Arial" panose="020B0604020202020204" pitchFamily="34" charset="0"/>
+              <a:buChar char="•"/>
+              <a:defRPr sz="2400" kern="1200">
+                <a:solidFill>
+                  <a:schemeClr val="tx1"/>
+                </a:solidFill>
+                <a:latin typeface="+mn-lt"/>
+                <a:ea typeface="+mn-ea"/>
+                <a:cs typeface="+mn-cs"/>
+              </a:defRPr>
+            </a:lvl2pPr>
+            <a:lvl3pPr marL="1143000" indent="-228600" algn="l" defTabSz="914400" rtl="0" eaLnBrk="1" latinLnBrk="0" hangingPunct="1">
+              <a:lnSpc>
+                <a:spcPct val="90000"/>
+              </a:lnSpc>
+              <a:spcBef>
+                <a:spcPts val="500"/>
+              </a:spcBef>
+              <a:buFont typeface="Arial" panose="020B0604020202020204" pitchFamily="34" charset="0"/>
+              <a:buChar char="•"/>
+              <a:defRPr sz="2000" kern="1200">
+                <a:solidFill>
+                  <a:schemeClr val="tx1"/>
+                </a:solidFill>
+                <a:latin typeface="+mn-lt"/>
+                <a:ea typeface="+mn-ea"/>
+                <a:cs typeface="+mn-cs"/>
+              </a:defRPr>
+            </a:lvl3pPr>
+            <a:lvl4pPr marL="1600200" indent="-228600" algn="l" defTabSz="914400" rtl="0" eaLnBrk="1" latinLnBrk="0" hangingPunct="1">
+              <a:lnSpc>
+                <a:spcPct val="90000"/>
+              </a:lnSpc>
+              <a:spcBef>
+                <a:spcPts val="500"/>
+              </a:spcBef>
+              <a:buFont typeface="Arial" panose="020B0604020202020204" pitchFamily="34" charset="0"/>
+              <a:buChar char="•"/>
+              <a:defRPr sz="1800" kern="1200">
+                <a:solidFill>
+                  <a:schemeClr val="tx1"/>
+                </a:solidFill>
+                <a:latin typeface="+mn-lt"/>
+                <a:ea typeface="+mn-ea"/>
+                <a:cs typeface="+mn-cs"/>
+              </a:defRPr>
+            </a:lvl4pPr>
+            <a:lvl5pPr marL="2057400" indent="-228600" algn="l" defTabSz="914400" rtl="0" eaLnBrk="1" latinLnBrk="0" hangingPunct="1">
+              <a:lnSpc>
+                <a:spcPct val="90000"/>
+              </a:lnSpc>
+              <a:spcBef>
+                <a:spcPts val="500"/>
+              </a:spcBef>
+              <a:buFont typeface="Arial" panose="020B0604020202020204" pitchFamily="34" charset="0"/>
+              <a:buChar char="•"/>
+              <a:defRPr sz="1800" kern="1200">
+                <a:solidFill>
+                  <a:schemeClr val="tx1"/>
+                </a:solidFill>
+                <a:latin typeface="+mn-lt"/>
+                <a:ea typeface="+mn-ea"/>
+                <a:cs typeface="+mn-cs"/>
+              </a:defRPr>
+            </a:lvl5pPr>
+            <a:lvl6pPr marL="2514600" indent="-228600" algn="l" defTabSz="914400" rtl="0" eaLnBrk="1" latinLnBrk="0" hangingPunct="1">
+              <a:lnSpc>
+                <a:spcPct val="90000"/>
+              </a:lnSpc>
+              <a:spcBef>
+                <a:spcPts val="500"/>
+              </a:spcBef>
+              <a:buFont typeface="Arial" panose="020B0604020202020204" pitchFamily="34" charset="0"/>
+              <a:buChar char="•"/>
+              <a:defRPr sz="1800" kern="1200">
+                <a:solidFill>
+                  <a:schemeClr val="tx1"/>
+                </a:solidFill>
+                <a:latin typeface="+mn-lt"/>
+                <a:ea typeface="+mn-ea"/>
+                <a:cs typeface="+mn-cs"/>
+              </a:defRPr>
+            </a:lvl6pPr>
+            <a:lvl7pPr marL="2971800" indent="-228600" algn="l" defTabSz="914400" rtl="0" eaLnBrk="1" latinLnBrk="0" hangingPunct="1">
+              <a:lnSpc>
+                <a:spcPct val="90000"/>
+              </a:lnSpc>
+              <a:spcBef>
+                <a:spcPts val="500"/>
+              </a:spcBef>
+              <a:buFont typeface="Arial" panose="020B0604020202020204" pitchFamily="34" charset="0"/>
+              <a:buChar char="•"/>
+              <a:defRPr sz="1800" kern="1200">
+                <a:solidFill>
+                  <a:schemeClr val="tx1"/>
+                </a:solidFill>
+                <a:latin typeface="+mn-lt"/>
+                <a:ea typeface="+mn-ea"/>
+                <a:cs typeface="+mn-cs"/>
+              </a:defRPr>
+            </a:lvl7pPr>
+            <a:lvl8pPr marL="3429000" indent="-228600" algn="l" defTabSz="914400" rtl="0" eaLnBrk="1" latinLnBrk="0" hangingPunct="1">
+              <a:lnSpc>
+                <a:spcPct val="90000"/>
+              </a:lnSpc>
+              <a:spcBef>
+                <a:spcPts val="500"/>
+              </a:spcBef>
+              <a:buFont typeface="Arial" panose="020B0604020202020204" pitchFamily="34" charset="0"/>
+              <a:buChar char="•"/>
+              <a:defRPr sz="1800" kern="1200">
+                <a:solidFill>
+                  <a:schemeClr val="tx1"/>
+                </a:solidFill>
+                <a:latin typeface="+mn-lt"/>
+                <a:ea typeface="+mn-ea"/>
+                <a:cs typeface="+mn-cs"/>
+              </a:defRPr>
+            </a:lvl8pPr>
+            <a:lvl9pPr marL="3886200" indent="-228600" algn="l" defTabSz="914400" rtl="0" eaLnBrk="1" latinLnBrk="0" hangingPunct="1">
+              <a:lnSpc>
+                <a:spcPct val="90000"/>
+              </a:lnSpc>
+              <a:spcBef>
+                <a:spcPts val="500"/>
+              </a:spcBef>
+              <a:buFont typeface="Arial" panose="020B0604020202020204" pitchFamily="34" charset="0"/>
+              <a:buChar char="•"/>
+              <a:defRPr sz="1800" kern="1200">
+                <a:solidFill>
+                  <a:schemeClr val="tx1"/>
+                </a:solidFill>
+                <a:latin typeface="+mn-lt"/>
+                <a:ea typeface="+mn-ea"/>
+                <a:cs typeface="+mn-cs"/>
+              </a:defRPr>
+            </a:lvl9pPr>
+          </a:lstStyle>
+          <a:p>
+            <a:pPr marL="0" indent="0">
+              <a:lnSpc>
+                <a:spcPct val="100000"/>
+              </a:lnSpc>
+              <a:buNone/>
+            </a:pPr>
+            <a:r>
+              <a:rPr lang="en-US" sz="1600" b="1" dirty="0"/>
+              <a:t>Particles</a:t>
+            </a:r>
+          </a:p>
+          <a:p>
+            <a:pPr>
+              <a:lnSpc>
+                <a:spcPct val="100000"/>
+              </a:lnSpc>
+            </a:pPr>
+            <a:r>
+              <a:rPr lang="en-US" sz="1200" dirty="0">
+                <a:solidFill>
+                  <a:schemeClr val="bg1">
+                    <a:lumMod val="85000"/>
+                  </a:schemeClr>
+                </a:solidFill>
+              </a:rPr>
+              <a:t>Poof particle when object drops on the ground</a:t>
+            </a:r>
+          </a:p>
+          <a:p>
+            <a:pPr>
+              <a:lnSpc>
+                <a:spcPct val="100000"/>
+              </a:lnSpc>
+            </a:pPr>
+            <a:r>
+              <a:rPr lang="en-US" sz="1200" dirty="0">
+                <a:solidFill>
+                  <a:schemeClr val="bg1">
+                    <a:lumMod val="85000"/>
+                  </a:schemeClr>
+                </a:solidFill>
+              </a:rPr>
+              <a:t>Sparkles when hover game-piece over board</a:t>
+            </a:r>
+          </a:p>
+          <a:p>
+            <a:pPr marL="0" indent="0">
+              <a:lnSpc>
+                <a:spcPct val="100000"/>
+              </a:lnSpc>
+              <a:buNone/>
+            </a:pPr>
+            <a:r>
+              <a:rPr lang="en-US" sz="1600" b="1" dirty="0"/>
+              <a:t>UX</a:t>
+            </a:r>
+          </a:p>
+          <a:p>
+            <a:pPr>
+              <a:lnSpc>
+                <a:spcPct val="100000"/>
+              </a:lnSpc>
+            </a:pPr>
+            <a:r>
+              <a:rPr lang="en-US" sz="1200" dirty="0"/>
+              <a:t>Hands should push pieces around in container</a:t>
+            </a:r>
+          </a:p>
+          <a:p>
+            <a:pPr>
+              <a:lnSpc>
+                <a:spcPct val="100000"/>
+              </a:lnSpc>
+            </a:pPr>
+            <a:r>
+              <a:rPr lang="en-US" sz="1200" dirty="0"/>
+              <a:t>Handle should move to hand when changing table height</a:t>
+            </a:r>
+          </a:p>
+          <a:p>
+            <a:pPr>
+              <a:lnSpc>
+                <a:spcPct val="100000"/>
+              </a:lnSpc>
+            </a:pPr>
+            <a:r>
+              <a:rPr lang="en-US" sz="1200" dirty="0"/>
+              <a:t>Let the player throw objects at the AI</a:t>
+            </a:r>
+          </a:p>
+          <a:p>
+            <a:pPr>
+              <a:lnSpc>
+                <a:spcPct val="100000"/>
+              </a:lnSpc>
+            </a:pPr>
+            <a:endParaRPr lang="en-US" sz="1600" dirty="0"/>
+          </a:p>
+          <a:p>
+            <a:pPr>
+              <a:lnSpc>
+                <a:spcPct val="100000"/>
+              </a:lnSpc>
+            </a:pPr>
+            <a:endParaRPr lang="en-US" sz="1200" dirty="0"/>
+          </a:p>
+        </p:txBody>
+      </p:sp>
+    </p:spTree>
+    <p:extLst>
+      <p:ext uri="{BB962C8B-B14F-4D97-AF65-F5344CB8AC3E}">
+        <p14:creationId xmlns:p14="http://schemas.microsoft.com/office/powerpoint/2010/main" val="1053834830"/>
       </p:ext>
     </p:extLst>
   </p:cSld>

</xml_diff>

<commit_message>
Prevent player from making a turn while its the AI's turn
</commit_message>
<xml_diff>
--- a/Process/TicTacToe_Process.pptx
+++ b/Process/TicTacToe_Process.pptx
@@ -4907,7 +4907,13 @@
               </a:lnSpc>
             </a:pPr>
             <a:r>
-              <a:rPr lang="en-US" sz="1200" dirty="0"/>
+              <a:rPr lang="en-US" sz="1200" dirty="0">
+                <a:solidFill>
+                  <a:schemeClr val="bg1">
+                    <a:lumMod val="85000"/>
+                  </a:schemeClr>
+                </a:solidFill>
+              </a:rPr>
               <a:t>Allow throwing shapes onto the table</a:t>
             </a:r>
           </a:p>

</xml_diff>

<commit_message>
Added sprites for different AI states and color animations.
</commit_message>
<xml_diff>
--- a/Process/TicTacToe_Process.pptx
+++ b/Process/TicTacToe_Process.pptx
@@ -4847,19 +4847,35 @@
               </a:lnSpc>
             </a:pPr>
             <a:r>
+              <a:rPr lang="en-US" sz="1200" dirty="0">
+                <a:solidFill>
+                  <a:schemeClr val="bg2">
+                    <a:lumMod val="90000"/>
+                  </a:schemeClr>
+                </a:solidFill>
+              </a:rPr>
+              <a:t>Faces (at least blinking)</a:t>
+            </a:r>
+          </a:p>
+          <a:p>
+            <a:pPr>
+              <a:lnSpc>
+                <a:spcPct val="100000"/>
+              </a:lnSpc>
+            </a:pPr>
+            <a:r>
               <a:rPr lang="en-US" sz="1200" dirty="0"/>
-              <a:t>Faces (at least blinking)</a:t>
-            </a:r>
-          </a:p>
-          <a:p>
-            <a:pPr>
-              <a:lnSpc>
-                <a:spcPct val="100000"/>
-              </a:lnSpc>
-            </a:pPr>
-            <a:r>
-              <a:rPr lang="en-US" sz="1200" dirty="0"/>
-              <a:t>More realistic motions / floating animation</a:t>
+              <a:t>More realistic motions / </a:t>
+            </a:r>
+            <a:r>
+              <a:rPr lang="en-US" sz="1200" dirty="0">
+                <a:solidFill>
+                  <a:schemeClr val="bg2">
+                    <a:lumMod val="90000"/>
+                  </a:schemeClr>
+                </a:solidFill>
+              </a:rPr>
+              <a:t>floating animation</a:t>
             </a:r>
           </a:p>
           <a:p>
@@ -4926,6 +4942,17 @@
             <a:r>
               <a:rPr lang="en-US" sz="1200" dirty="0"/>
               <a:t>Communicate who’s turn it is</a:t>
+            </a:r>
+          </a:p>
+          <a:p>
+            <a:pPr>
+              <a:lnSpc>
+                <a:spcPct val="100000"/>
+              </a:lnSpc>
+            </a:pPr>
+            <a:r>
+              <a:rPr lang="en-US" sz="1200" dirty="0"/>
+              <a:t>Communicate who won/lose/tie</a:t>
             </a:r>
           </a:p>
           <a:p>
@@ -5230,7 +5257,13 @@
               </a:lnSpc>
             </a:pPr>
             <a:r>
-              <a:rPr lang="en-US" sz="1200" dirty="0"/>
+              <a:rPr lang="en-US" sz="1200" dirty="0">
+                <a:solidFill>
+                  <a:schemeClr val="bg2">
+                    <a:lumMod val="90000"/>
+                  </a:schemeClr>
+                </a:solidFill>
+              </a:rPr>
               <a:t>Let the player throw objects at the AI</a:t>
             </a:r>
           </a:p>

</xml_diff>

<commit_message>
Added confetti at the end of the game
</commit_message>
<xml_diff>
--- a/Process/TicTacToe_Process.pptx
+++ b/Process/TicTacToe_Process.pptx
@@ -8,6 +8,7 @@
     <p:sldId id="256" r:id="rId2"/>
     <p:sldId id="257" r:id="rId3"/>
     <p:sldId id="258" r:id="rId4"/>
+    <p:sldId id="259" r:id="rId5"/>
   </p:sldIdLst>
   <p:sldSz cx="12192000" cy="6858000"/>
   <p:notesSz cx="6858000" cy="9144000"/>
@@ -261,7 +262,7 @@
           <a:p>
             <a:fld id="{10DF905A-BCB7-4E5B-9F33-1E1372E6213B}" type="datetimeFigureOut">
               <a:rPr lang="en-US" smtClean="0"/>
-              <a:t>4/20/2019</a:t>
+              <a:t>4/21/2019</a:t>
             </a:fld>
             <a:endParaRPr lang="en-US"/>
           </a:p>
@@ -459,7 +460,7 @@
           <a:p>
             <a:fld id="{10DF905A-BCB7-4E5B-9F33-1E1372E6213B}" type="datetimeFigureOut">
               <a:rPr lang="en-US" smtClean="0"/>
-              <a:t>4/20/2019</a:t>
+              <a:t>4/21/2019</a:t>
             </a:fld>
             <a:endParaRPr lang="en-US"/>
           </a:p>
@@ -667,7 +668,7 @@
           <a:p>
             <a:fld id="{10DF905A-BCB7-4E5B-9F33-1E1372E6213B}" type="datetimeFigureOut">
               <a:rPr lang="en-US" smtClean="0"/>
-              <a:t>4/20/2019</a:t>
+              <a:t>4/21/2019</a:t>
             </a:fld>
             <a:endParaRPr lang="en-US"/>
           </a:p>
@@ -865,7 +866,7 @@
           <a:p>
             <a:fld id="{10DF905A-BCB7-4E5B-9F33-1E1372E6213B}" type="datetimeFigureOut">
               <a:rPr lang="en-US" smtClean="0"/>
-              <a:t>4/20/2019</a:t>
+              <a:t>4/21/2019</a:t>
             </a:fld>
             <a:endParaRPr lang="en-US"/>
           </a:p>
@@ -1140,7 +1141,7 @@
           <a:p>
             <a:fld id="{10DF905A-BCB7-4E5B-9F33-1E1372E6213B}" type="datetimeFigureOut">
               <a:rPr lang="en-US" smtClean="0"/>
-              <a:t>4/20/2019</a:t>
+              <a:t>4/21/2019</a:t>
             </a:fld>
             <a:endParaRPr lang="en-US"/>
           </a:p>
@@ -1405,7 +1406,7 @@
           <a:p>
             <a:fld id="{10DF905A-BCB7-4E5B-9F33-1E1372E6213B}" type="datetimeFigureOut">
               <a:rPr lang="en-US" smtClean="0"/>
-              <a:t>4/20/2019</a:t>
+              <a:t>4/21/2019</a:t>
             </a:fld>
             <a:endParaRPr lang="en-US"/>
           </a:p>
@@ -1817,7 +1818,7 @@
           <a:p>
             <a:fld id="{10DF905A-BCB7-4E5B-9F33-1E1372E6213B}" type="datetimeFigureOut">
               <a:rPr lang="en-US" smtClean="0"/>
-              <a:t>4/20/2019</a:t>
+              <a:t>4/21/2019</a:t>
             </a:fld>
             <a:endParaRPr lang="en-US"/>
           </a:p>
@@ -1958,7 +1959,7 @@
           <a:p>
             <a:fld id="{10DF905A-BCB7-4E5B-9F33-1E1372E6213B}" type="datetimeFigureOut">
               <a:rPr lang="en-US" smtClean="0"/>
-              <a:t>4/20/2019</a:t>
+              <a:t>4/21/2019</a:t>
             </a:fld>
             <a:endParaRPr lang="en-US"/>
           </a:p>
@@ -2071,7 +2072,7 @@
           <a:p>
             <a:fld id="{10DF905A-BCB7-4E5B-9F33-1E1372E6213B}" type="datetimeFigureOut">
               <a:rPr lang="en-US" smtClean="0"/>
-              <a:t>4/20/2019</a:t>
+              <a:t>4/21/2019</a:t>
             </a:fld>
             <a:endParaRPr lang="en-US"/>
           </a:p>
@@ -2382,7 +2383,7 @@
           <a:p>
             <a:fld id="{10DF905A-BCB7-4E5B-9F33-1E1372E6213B}" type="datetimeFigureOut">
               <a:rPr lang="en-US" smtClean="0"/>
-              <a:t>4/20/2019</a:t>
+              <a:t>4/21/2019</a:t>
             </a:fld>
             <a:endParaRPr lang="en-US"/>
           </a:p>
@@ -2670,7 +2671,7 @@
           <a:p>
             <a:fld id="{10DF905A-BCB7-4E5B-9F33-1E1372E6213B}" type="datetimeFigureOut">
               <a:rPr lang="en-US" smtClean="0"/>
-              <a:t>4/20/2019</a:t>
+              <a:t>4/21/2019</a:t>
             </a:fld>
             <a:endParaRPr lang="en-US"/>
           </a:p>
@@ -2911,7 +2912,7 @@
           <a:p>
             <a:fld id="{10DF905A-BCB7-4E5B-9F33-1E1372E6213B}" type="datetimeFigureOut">
               <a:rPr lang="en-US" smtClean="0"/>
-              <a:t>4/20/2019</a:t>
+              <a:t>4/21/2019</a:t>
             </a:fld>
             <a:endParaRPr lang="en-US"/>
           </a:p>
@@ -4410,7 +4411,7 @@
           <a:p>
             <a:r>
               <a:rPr lang="en-US" dirty="0"/>
-              <a:t>User Feedback Session #1</a:t>
+              <a:t>User Feedback Session</a:t>
             </a:r>
           </a:p>
         </p:txBody>
@@ -4952,7 +4953,7 @@
             </a:pPr>
             <a:r>
               <a:rPr lang="en-US" sz="1200" dirty="0"/>
-              <a:t>Communicate who won/lose/tie</a:t>
+              <a:t>Make it fun/sad when you lose. “Incredibly disappointing when I win that nothing happens”</a:t>
             </a:r>
           </a:p>
           <a:p>
@@ -4962,19 +4963,14 @@
               </a:lnSpc>
             </a:pPr>
             <a:r>
-              <a:rPr lang="en-US" sz="1200" dirty="0"/>
-              <a:t>Make it fun/sad when you lose. “Incredibly disappointing when I win that nothing happens”</a:t>
-            </a:r>
-          </a:p>
-          <a:p>
-            <a:pPr>
-              <a:lnSpc>
-                <a:spcPct val="100000"/>
-              </a:lnSpc>
-            </a:pPr>
-            <a:r>
-              <a:rPr lang="en-US" sz="1200" dirty="0"/>
-              <a:t>Block placing pieces while its not your turn (make shapes turn transparent when near the board)</a:t>
+              <a:rPr lang="en-US" sz="1200" dirty="0">
+                <a:solidFill>
+                  <a:schemeClr val="bg2">
+                    <a:lumMod val="75000"/>
+                  </a:schemeClr>
+                </a:solidFill>
+              </a:rPr>
+              <a:t>Block placing pieces while its not your turn.</a:t>
             </a:r>
           </a:p>
         </p:txBody>
@@ -5289,6 +5285,101 @@
     <p:extLst>
       <p:ext uri="{BB962C8B-B14F-4D97-AF65-F5344CB8AC3E}">
         <p14:creationId xmlns:p14="http://schemas.microsoft.com/office/powerpoint/2010/main" val="1053834830"/>
+      </p:ext>
+    </p:extLst>
+  </p:cSld>
+  <p:clrMapOvr>
+    <a:masterClrMapping/>
+  </p:clrMapOvr>
+</p:sld>
+</file>
+
+<file path=ppt/slides/slide4.xml><?xml version="1.0" encoding="utf-8"?>
+<p:sld xmlns:a="http://schemas.openxmlformats.org/drawingml/2006/main" xmlns:r="http://schemas.openxmlformats.org/officeDocument/2006/relationships" xmlns:p="http://schemas.openxmlformats.org/presentationml/2006/main">
+  <p:cSld>
+    <p:spTree>
+      <p:nvGrpSpPr>
+        <p:cNvPr id="1" name=""/>
+        <p:cNvGrpSpPr/>
+        <p:nvPr/>
+      </p:nvGrpSpPr>
+      <p:grpSpPr>
+        <a:xfrm>
+          <a:off x="0" y="0"/>
+          <a:ext cx="0" cy="0"/>
+          <a:chOff x="0" y="0"/>
+          <a:chExt cx="0" cy="0"/>
+        </a:xfrm>
+      </p:grpSpPr>
+      <p:sp>
+        <p:nvSpPr>
+          <p:cNvPr id="2" name="Title 1">
+            <a:extLst>
+              <a:ext uri="{FF2B5EF4-FFF2-40B4-BE49-F238E27FC236}">
+                <a16:creationId xmlns:a16="http://schemas.microsoft.com/office/drawing/2014/main" id="{AC160689-EBBB-4CEE-9DB9-2E201E34D02B}"/>
+              </a:ext>
+            </a:extLst>
+          </p:cNvPr>
+          <p:cNvSpPr>
+            <a:spLocks noGrp="1"/>
+          </p:cNvSpPr>
+          <p:nvPr>
+            <p:ph type="title"/>
+          </p:nvPr>
+        </p:nvSpPr>
+        <p:spPr/>
+        <p:txBody>
+          <a:bodyPr/>
+          <a:lstStyle/>
+          <a:p>
+            <a:r>
+              <a:rPr lang="en-US" dirty="0"/>
+              <a:t>Other</a:t>
+            </a:r>
+          </a:p>
+        </p:txBody>
+      </p:sp>
+      <p:sp>
+        <p:nvSpPr>
+          <p:cNvPr id="3" name="Content Placeholder 2">
+            <a:extLst>
+              <a:ext uri="{FF2B5EF4-FFF2-40B4-BE49-F238E27FC236}">
+                <a16:creationId xmlns:a16="http://schemas.microsoft.com/office/drawing/2014/main" id="{E74BD15E-808C-4E35-A797-232954CD1D27}"/>
+              </a:ext>
+            </a:extLst>
+          </p:cNvPr>
+          <p:cNvSpPr>
+            <a:spLocks noGrp="1"/>
+          </p:cNvSpPr>
+          <p:nvPr>
+            <p:ph idx="1"/>
+          </p:nvPr>
+        </p:nvSpPr>
+        <p:spPr/>
+        <p:txBody>
+          <a:bodyPr/>
+          <a:lstStyle/>
+          <a:p>
+            <a:r>
+              <a:rPr lang="en-US" dirty="0"/>
+              <a:t>Add plant environment</a:t>
+            </a:r>
+          </a:p>
+          <a:p>
+            <a:r>
+              <a:rPr lang="en-US" dirty="0"/>
+              <a:t>Add sounds / music</a:t>
+            </a:r>
+          </a:p>
+          <a:p>
+            <a:endParaRPr lang="en-US" dirty="0"/>
+          </a:p>
+        </p:txBody>
+      </p:sp>
+    </p:spTree>
+    <p:extLst>
+      <p:ext uri="{BB962C8B-B14F-4D97-AF65-F5344CB8AC3E}">
+        <p14:creationId xmlns:p14="http://schemas.microsoft.com/office/powerpoint/2010/main" val="2440970134"/>
       </p:ext>
     </p:extLst>
   </p:cSld>

</xml_diff>

<commit_message>
Added bezier curve and animation curve to character hand motion
</commit_message>
<xml_diff>
--- a/Process/TicTacToe_Process.pptx
+++ b/Process/TicTacToe_Process.pptx
@@ -4865,18 +4865,14 @@
               </a:lnSpc>
             </a:pPr>
             <a:r>
-              <a:rPr lang="en-US" sz="1200" dirty="0"/>
-              <a:t>More realistic motions / </a:t>
-            </a:r>
-            <a:r>
               <a:rPr lang="en-US" sz="1200" dirty="0">
                 <a:solidFill>
-                  <a:schemeClr val="bg2">
-                    <a:lumMod val="90000"/>
+                  <a:schemeClr val="bg1">
+                    <a:lumMod val="75000"/>
                   </a:schemeClr>
                 </a:solidFill>
               </a:rPr>
-              <a:t>floating animation</a:t>
+              <a:t>More realistic motions / floating animation</a:t>
             </a:r>
           </a:p>
           <a:p>
@@ -4952,7 +4948,13 @@
               </a:lnSpc>
             </a:pPr>
             <a:r>
-              <a:rPr lang="en-US" sz="1200" dirty="0"/>
+              <a:rPr lang="en-US" sz="1200" dirty="0">
+                <a:solidFill>
+                  <a:schemeClr val="bg1">
+                    <a:lumMod val="75000"/>
+                  </a:schemeClr>
+                </a:solidFill>
+              </a:rPr>
               <a:t>Make it fun/sad when you lose. “Incredibly disappointing when I win that nothing happens”</a:t>
             </a:r>
           </a:p>

</xml_diff>

<commit_message>
Fixed a few bugs that was allowing hand to get stuck grabbing an object
</commit_message>
<xml_diff>
--- a/Process/TicTacToe_Process.pptx
+++ b/Process/TicTacToe_Process.pptx
@@ -4480,7 +4480,13 @@
               </a:lnSpc>
             </a:pPr>
             <a:r>
-              <a:rPr lang="en-US" sz="1200" dirty="0"/>
+              <a:rPr lang="en-US" sz="1200" dirty="0">
+                <a:solidFill>
+                  <a:schemeClr val="bg2">
+                    <a:lumMod val="90000"/>
+                  </a:schemeClr>
+                </a:solidFill>
+              </a:rPr>
               <a:t>All table motion in all directions, not just up/down</a:t>
             </a:r>
           </a:p>
@@ -4937,7 +4943,13 @@
               </a:lnSpc>
             </a:pPr>
             <a:r>
-              <a:rPr lang="en-US" sz="1200" dirty="0"/>
+              <a:rPr lang="en-US" sz="1200" dirty="0">
+                <a:solidFill>
+                  <a:schemeClr val="bg2">
+                    <a:lumMod val="90000"/>
+                  </a:schemeClr>
+                </a:solidFill>
+              </a:rPr>
               <a:t>Communicate who’s turn it is</a:t>
             </a:r>
           </a:p>

</xml_diff>